<commit_message>
Change the clustering of members to Tower vs Warehouse instead of their organizational division.
</commit_message>
<xml_diff>
--- a/app/data/visual_data/results.pptx
+++ b/app/data/visual_data/results.pptx
@@ -3186,9 +3186,23 @@
         <p:txBody>
           <a:bodyPr/>
           <a:lstStyle/>
-          <a:p>
-            <a:r>
-              <a:t>Last 30 days:</a:t>
+          <a:p/>
+          <a:p>
+            <a:pPr/>
+            <a:r>
+              <a:t>Yesterday:</a:t>
+            </a:r>
+          </a:p>
+          <a:p>
+            <a:pPr lvl="1"/>
+            <a:r>
+              <a:t>Ron Casselman donated $100.00 to Ronald Casselman.</a:t>
+            </a:r>
+          </a:p>
+          <a:p>
+            <a:pPr/>
+            <a:r>
+              <a:t>Last month:</a:t>
             </a:r>
           </a:p>
           <a:p>
@@ -3313,7 +3327,7 @@
           <a:lstStyle/>
           <a:p>
             <a:r>
-              <a:t>LTN - Section Competition Results</a:t>
+              <a:t>LTN - Competition Results</a:t>
             </a:r>
           </a:p>
         </p:txBody>
@@ -3351,8 +3365,8 @@
         </p:blipFill>
         <p:spPr>
           <a:xfrm>
-            <a:off x="914400" y="1097280"/>
-            <a:ext cx="7315200" cy="5486400"/>
+            <a:off x="914400" y="1188720"/>
+            <a:ext cx="7010400" cy="5257800"/>
           </a:xfrm>
           <a:prstGeom prst="rect">
             <a:avLst/>

</xml_diff>